<commit_message>
Minor fixes for "07-Sets-and-Dictionaries" exercises
</commit_message>
<xml_diff>
--- a/Courses/Software-Sciences/Module-2-DS-and-Algo-New/07-Sets-and-Dictionaries/07-Sets-and-Dictionaries.pptx
+++ b/Courses/Software-Sciences/Module-2-DS-and-Algo-New/07-Sets-and-Dictionaries/07-Sets-and-Dictionaries.pptx
@@ -326,7 +326,7 @@
           <a:p>
             <a:fld id="{4E087215-0C8F-4762-A664-737A353EC9A4}" type="datetimeFigureOut">
               <a:rPr lang="bg-BG" smtClean="0"/>
-              <a:t>27.1.2023 г.</a:t>
+              <a:t>1.2.2023 г.</a:t>
             </a:fld>
             <a:endParaRPr lang="bg-BG"/>
           </a:p>
@@ -517,7 +517,7 @@
           <a:p>
             <a:fld id="{72D84649-876A-46C9-8472-14CB09C070D8}" type="datetimeFigureOut">
               <a:rPr lang="en-US" smtClean="0"/>
-              <a:t>1/27/2023</a:t>
+              <a:t>2/1/2023</a:t>
             </a:fld>
             <a:endParaRPr lang="en-US"/>
           </a:p>
@@ -8374,9 +8374,30 @@
           <a:lstStyle/>
           <a:p>
             <a:r>
-              <a:rPr lang="en-US" sz="1799" dirty="0"/>
-              <a:t>Software University</a:t>
-            </a:r>
+              <a:rPr lang="en-US" sz="1800" dirty="0" err="1">
+                <a:ea typeface="+mn-lt"/>
+                <a:cs typeface="+mn-lt"/>
+              </a:rPr>
+              <a:t>Софтуерен</a:t>
+            </a:r>
+            <a:r>
+              <a:rPr lang="en-US" sz="1800" dirty="0">
+                <a:ea typeface="+mn-lt"/>
+                <a:cs typeface="+mn-lt"/>
+              </a:rPr>
+              <a:t> </a:t>
+            </a:r>
+            <a:r>
+              <a:rPr lang="en-US" sz="1800" dirty="0" err="1">
+                <a:ea typeface="+mn-lt"/>
+                <a:cs typeface="+mn-lt"/>
+              </a:rPr>
+              <a:t>университет</a:t>
+            </a:r>
+            <a:endParaRPr lang="en-US" sz="1800" b="0" dirty="0">
+              <a:ea typeface="+mn-lt"/>
+              <a:cs typeface="+mn-lt"/>
+            </a:endParaRPr>
           </a:p>
         </p:txBody>
       </p:sp>
@@ -8431,13 +8452,13 @@
           <a:lstStyle/>
           <a:p>
             <a:r>
-              <a:rPr lang="en-US" sz="1999" dirty="0" err="1"/>
-              <a:t>SoftUni</a:t>
-            </a:r>
-            <a:r>
-              <a:rPr lang="en-US" sz="1999" dirty="0"/>
-              <a:t> Team</a:t>
-            </a:r>
+              <a:rPr lang="en-US" sz="2000" dirty="0" err="1">
+                <a:ea typeface="+mn-lt"/>
+                <a:cs typeface="+mn-lt"/>
+              </a:rPr>
+              <a:t>СофтУни</a:t>
+            </a:r>
+            <a:endParaRPr lang="en-US" sz="1999" dirty="0"/>
           </a:p>
         </p:txBody>
       </p:sp>
@@ -8462,9 +8483,27 @@
           <a:lstStyle/>
           <a:p>
             <a:r>
-              <a:rPr lang="en-US" sz="1799" dirty="0"/>
-              <a:t>Technical Trainers</a:t>
-            </a:r>
+              <a:rPr lang="en-US" sz="1800" dirty="0" err="1">
+                <a:ea typeface="+mn-lt"/>
+                <a:cs typeface="+mn-lt"/>
+              </a:rPr>
+              <a:t>Преподавателски</a:t>
+            </a:r>
+            <a:r>
+              <a:rPr lang="en-US" sz="1800" dirty="0">
+                <a:ea typeface="+mn-lt"/>
+                <a:cs typeface="+mn-lt"/>
+              </a:rPr>
+              <a:t> </a:t>
+            </a:r>
+            <a:r>
+              <a:rPr lang="en-US" sz="1800" dirty="0" err="1">
+                <a:ea typeface="+mn-lt"/>
+                <a:cs typeface="+mn-lt"/>
+              </a:rPr>
+              <a:t>екип</a:t>
+            </a:r>
+            <a:endParaRPr lang="bg-BG" sz="1800" dirty="0"/>
           </a:p>
         </p:txBody>
       </p:sp>

</xml_diff>